<commit_message>
modify mc standalone part
</commit_message>
<xml_diff>
--- a/figure.pptx
+++ b/figure.pptx
@@ -6,6 +6,7 @@
   </p:sldMasterIdLst>
   <p:sldIdLst>
     <p:sldId id="256" r:id="rId2"/>
+    <p:sldId id="257" r:id="rId3"/>
   </p:sldIdLst>
   <p:sldSz cx="12192000" cy="6858000"/>
   <p:notesSz cx="4279900" cy="5486400"/>
@@ -104,6 +105,11 @@
       </a:defRPr>
     </a:lvl9pPr>
   </p:defaultTextStyle>
+  <p:extLst>
+    <p:ext uri="{EFAFB233-063F-42B5-8137-9DF3F51BA10A}">
+      <p15:sldGuideLst xmlns:p15="http://schemas.microsoft.com/office/powerpoint/2012/main"/>
+    </p:ext>
+  </p:extLst>
 </p:presentation>
 </file>
 
@@ -238,7 +244,7 @@
           <a:p>
             <a:fld id="{0D271F71-DBCC-4D5E-B532-0341B38E2B4F}" type="datetimeFigureOut">
               <a:rPr kumimoji="1" lang="ja-JP" altLang="en-US" smtClean="0"/>
-              <a:t>2017/12/9</a:t>
+              <a:t>2017/12/14</a:t>
             </a:fld>
             <a:endParaRPr kumimoji="1" lang="ja-JP" altLang="en-US"/>
           </a:p>
@@ -440,7 +446,7 @@
           <a:p>
             <a:fld id="{0D271F71-DBCC-4D5E-B532-0341B38E2B4F}" type="datetimeFigureOut">
               <a:rPr kumimoji="1" lang="ja-JP" altLang="en-US" smtClean="0"/>
-              <a:t>2017/12/9</a:t>
+              <a:t>2017/12/14</a:t>
             </a:fld>
             <a:endParaRPr kumimoji="1" lang="ja-JP" altLang="en-US"/>
           </a:p>
@@ -652,7 +658,7 @@
           <a:p>
             <a:fld id="{0D271F71-DBCC-4D5E-B532-0341B38E2B4F}" type="datetimeFigureOut">
               <a:rPr kumimoji="1" lang="ja-JP" altLang="en-US" smtClean="0"/>
-              <a:t>2017/12/9</a:t>
+              <a:t>2017/12/14</a:t>
             </a:fld>
             <a:endParaRPr kumimoji="1" lang="ja-JP" altLang="en-US"/>
           </a:p>
@@ -854,7 +860,7 @@
           <a:p>
             <a:fld id="{0D271F71-DBCC-4D5E-B532-0341B38E2B4F}" type="datetimeFigureOut">
               <a:rPr kumimoji="1" lang="ja-JP" altLang="en-US" smtClean="0"/>
-              <a:t>2017/12/9</a:t>
+              <a:t>2017/12/14</a:t>
             </a:fld>
             <a:endParaRPr kumimoji="1" lang="ja-JP" altLang="en-US"/>
           </a:p>
@@ -1100,7 +1106,7 @@
           <a:p>
             <a:fld id="{0D271F71-DBCC-4D5E-B532-0341B38E2B4F}" type="datetimeFigureOut">
               <a:rPr kumimoji="1" lang="ja-JP" altLang="en-US" smtClean="0"/>
-              <a:t>2017/12/9</a:t>
+              <a:t>2017/12/14</a:t>
             </a:fld>
             <a:endParaRPr kumimoji="1" lang="ja-JP" altLang="en-US"/>
           </a:p>
@@ -1396,7 +1402,7 @@
           <a:p>
             <a:fld id="{0D271F71-DBCC-4D5E-B532-0341B38E2B4F}" type="datetimeFigureOut">
               <a:rPr kumimoji="1" lang="ja-JP" altLang="en-US" smtClean="0"/>
-              <a:t>2017/12/9</a:t>
+              <a:t>2017/12/14</a:t>
             </a:fld>
             <a:endParaRPr kumimoji="1" lang="ja-JP" altLang="en-US"/>
           </a:p>
@@ -1827,7 +1833,7 @@
           <a:p>
             <a:fld id="{0D271F71-DBCC-4D5E-B532-0341B38E2B4F}" type="datetimeFigureOut">
               <a:rPr kumimoji="1" lang="ja-JP" altLang="en-US" smtClean="0"/>
-              <a:t>2017/12/9</a:t>
+              <a:t>2017/12/14</a:t>
             </a:fld>
             <a:endParaRPr kumimoji="1" lang="ja-JP" altLang="en-US"/>
           </a:p>
@@ -1945,7 +1951,7 @@
           <a:p>
             <a:fld id="{0D271F71-DBCC-4D5E-B532-0341B38E2B4F}" type="datetimeFigureOut">
               <a:rPr kumimoji="1" lang="ja-JP" altLang="en-US" smtClean="0"/>
-              <a:t>2017/12/9</a:t>
+              <a:t>2017/12/14</a:t>
             </a:fld>
             <a:endParaRPr kumimoji="1" lang="ja-JP" altLang="en-US"/>
           </a:p>
@@ -2040,7 +2046,7 @@
           <a:p>
             <a:fld id="{0D271F71-DBCC-4D5E-B532-0341B38E2B4F}" type="datetimeFigureOut">
               <a:rPr kumimoji="1" lang="ja-JP" altLang="en-US" smtClean="0"/>
-              <a:t>2017/12/9</a:t>
+              <a:t>2017/12/14</a:t>
             </a:fld>
             <a:endParaRPr kumimoji="1" lang="ja-JP" altLang="en-US"/>
           </a:p>
@@ -2349,7 +2355,7 @@
           <a:p>
             <a:fld id="{0D271F71-DBCC-4D5E-B532-0341B38E2B4F}" type="datetimeFigureOut">
               <a:rPr kumimoji="1" lang="ja-JP" altLang="en-US" smtClean="0"/>
-              <a:t>2017/12/9</a:t>
+              <a:t>2017/12/14</a:t>
             </a:fld>
             <a:endParaRPr kumimoji="1" lang="ja-JP" altLang="en-US"/>
           </a:p>
@@ -2602,7 +2608,7 @@
           <a:p>
             <a:fld id="{0D271F71-DBCC-4D5E-B532-0341B38E2B4F}" type="datetimeFigureOut">
               <a:rPr kumimoji="1" lang="ja-JP" altLang="en-US" smtClean="0"/>
-              <a:t>2017/12/9</a:t>
+              <a:t>2017/12/14</a:t>
             </a:fld>
             <a:endParaRPr kumimoji="1" lang="ja-JP" altLang="en-US"/>
           </a:p>
@@ -2847,7 +2853,7 @@
           <a:p>
             <a:fld id="{0D271F71-DBCC-4D5E-B532-0341B38E2B4F}" type="datetimeFigureOut">
               <a:rPr kumimoji="1" lang="ja-JP" altLang="en-US" smtClean="0"/>
-              <a:t>2017/12/9</a:t>
+              <a:t>2017/12/14</a:t>
             </a:fld>
             <a:endParaRPr kumimoji="1" lang="ja-JP" altLang="en-US"/>
           </a:p>
@@ -3344,6 +3350,90 @@
 </p:sld>
 </file>
 
+<file path=ppt/slides/slide2.xml><?xml version="1.0" encoding="utf-8"?>
+<p:sld xmlns:a="http://schemas.openxmlformats.org/drawingml/2006/main" xmlns:r="http://schemas.openxmlformats.org/officeDocument/2006/relationships" xmlns:p="http://schemas.openxmlformats.org/presentationml/2006/main">
+  <p:cSld>
+    <p:spTree>
+      <p:nvGrpSpPr>
+        <p:cNvPr id="1" name=""/>
+        <p:cNvGrpSpPr/>
+        <p:nvPr/>
+      </p:nvGrpSpPr>
+      <p:grpSpPr>
+        <a:xfrm>
+          <a:off x="0" y="0"/>
+          <a:ext cx="0" cy="0"/>
+          <a:chOff x="0" y="0"/>
+          <a:chExt cx="0" cy="0"/>
+        </a:xfrm>
+      </p:grpSpPr>
+      <p:pic>
+        <p:nvPicPr>
+          <p:cNvPr id="2" name="図 1"/>
+          <p:cNvPicPr>
+            <a:picLocks noChangeAspect="1"/>
+          </p:cNvPicPr>
+          <p:nvPr/>
+        </p:nvPicPr>
+        <p:blipFill>
+          <a:blip r:embed="rId2">
+            <a:extLst>
+              <a:ext uri="{28A0092B-C50C-407E-A947-70E740481C1C}">
+                <a14:useLocalDpi xmlns:a14="http://schemas.microsoft.com/office/drawing/2010/main" val="0"/>
+              </a:ext>
+            </a:extLst>
+          </a:blip>
+          <a:stretch>
+            <a:fillRect/>
+          </a:stretch>
+        </p:blipFill>
+        <p:spPr>
+          <a:xfrm>
+            <a:off x="317404" y="1374887"/>
+            <a:ext cx="5880411" cy="4458646"/>
+          </a:xfrm>
+          <a:prstGeom prst="rect">
+            <a:avLst/>
+          </a:prstGeom>
+        </p:spPr>
+      </p:pic>
+      <p:pic>
+        <p:nvPicPr>
+          <p:cNvPr id="3" name="図 2"/>
+          <p:cNvPicPr>
+            <a:picLocks noChangeAspect="1"/>
+          </p:cNvPicPr>
+          <p:nvPr/>
+        </p:nvPicPr>
+        <p:blipFill>
+          <a:blip r:embed="rId3"/>
+          <a:stretch>
+            <a:fillRect/>
+          </a:stretch>
+        </p:blipFill>
+        <p:spPr>
+          <a:xfrm>
+            <a:off x="6333067" y="1291275"/>
+            <a:ext cx="4924678" cy="4427851"/>
+          </a:xfrm>
+          <a:prstGeom prst="rect">
+            <a:avLst/>
+          </a:prstGeom>
+        </p:spPr>
+      </p:pic>
+    </p:spTree>
+    <p:extLst>
+      <p:ext uri="{BB962C8B-B14F-4D97-AF65-F5344CB8AC3E}">
+        <p14:creationId xmlns:p14="http://schemas.microsoft.com/office/powerpoint/2010/main" val="3506599050"/>
+      </p:ext>
+    </p:extLst>
+  </p:cSld>
+  <p:clrMapOvr>
+    <a:masterClrMapping/>
+  </p:clrMapOvr>
+</p:sld>
+</file>
+
 <file path=ppt/theme/theme1.xml><?xml version="1.0" encoding="utf-8"?>
 <a:theme xmlns:a="http://schemas.openxmlformats.org/drawingml/2006/main" name="Office テーマ">
   <a:themeElements>

</xml_diff>